<commit_message>
added features slide to presentation
</commit_message>
<xml_diff>
--- a/Presentation/Project1Presentation.pptx
+++ b/Presentation/Project1Presentation.pptx
@@ -15,6 +15,7 @@
     <p:sldId id="260" r:id="rId12"/>
     <p:sldId id="261" r:id="rId13"/>
     <p:sldId id="262" r:id="rId14"/>
+    <p:sldId id="263" r:id="rId15"/>
   </p:sldIdLst>
   <p:sldSz cx="24384000" cy="13716000"/>
   <p:notesSz cx="6858000" cy="9144000"/>
@@ -3867,7 +3868,7 @@
         </p:nvSpPr>
         <p:spPr>
           <a:xfrm>
-            <a:off x="1206498" y="4179590"/>
+            <a:off x="1206498" y="4179591"/>
             <a:ext cx="21971004" cy="4648201"/>
           </a:xfrm>
           <a:prstGeom prst="rect">
@@ -3899,8 +3900,8 @@
         </p:nvSpPr>
         <p:spPr>
           <a:xfrm>
-            <a:off x="1206499" y="3448958"/>
-            <a:ext cx="21971001" cy="1905001"/>
+            <a:off x="1206500" y="3448958"/>
+            <a:ext cx="21971000" cy="1905001"/>
           </a:xfrm>
           <a:prstGeom prst="rect">
             <a:avLst/>
@@ -4002,7 +4003,7 @@
       </p:grpSpPr>
       <p:pic>
         <p:nvPicPr>
-          <p:cNvPr id="157" name="circleIntercetion.png" descr="circleIntercetion.png"/>
+          <p:cNvPr id="157" name="features.png" descr="features.png"/>
           <p:cNvPicPr>
             <a:picLocks noChangeAspect="1"/>
           </p:cNvPicPr>
@@ -4057,7 +4058,7 @@
       </p:grpSpPr>
       <p:pic>
         <p:nvPicPr>
-          <p:cNvPr id="159" name="bigmistake1.png" descr="bigmistake1.png"/>
+          <p:cNvPr id="159" name="circleIntercetion.png" descr="circleIntercetion.png"/>
           <p:cNvPicPr>
             <a:picLocks noChangeAspect="1"/>
           </p:cNvPicPr>
@@ -4112,7 +4113,7 @@
       </p:grpSpPr>
       <p:pic>
         <p:nvPicPr>
-          <p:cNvPr id="161" name="bigmistake2.png" descr="bigmistake2.png"/>
+          <p:cNvPr id="161" name="bigmistake1.png" descr="bigmistake1.png"/>
           <p:cNvPicPr>
             <a:picLocks noChangeAspect="1"/>
           </p:cNvPicPr>
@@ -4165,38 +4166,35 @@
           <a:chExt cx="0" cy="0"/>
         </a:xfrm>
       </p:grpSpPr>
-      <p:sp>
-        <p:nvSpPr>
-          <p:cNvPr id="163" name="DEMO"/>
-          <p:cNvSpPr txBox="1"/>
+      <p:pic>
+        <p:nvPicPr>
+          <p:cNvPr id="163" name="bigmistake2.png" descr="bigmistake2.png"/>
+          <p:cNvPicPr>
+            <a:picLocks noChangeAspect="1"/>
+          </p:cNvPicPr>
           <p:nvPr>
-            <p:ph type="ctrTitle"/>
+            <p:ph type="pic" idx="13"/>
           </p:nvPr>
-        </p:nvSpPr>
+        </p:nvPicPr>
+        <p:blipFill>
+          <a:blip r:embed="rId2">
+            <a:extLst/>
+          </a:blip>
+          <a:srcRect l="0" t="0" r="0" b="0"/>
+          <a:stretch>
+            <a:fillRect/>
+          </a:stretch>
+        </p:blipFill>
         <p:spPr>
           <a:xfrm>
-            <a:off x="1206498" y="4533900"/>
-            <a:ext cx="21971004" cy="4648200"/>
+            <a:off x="3900090" y="995957"/>
+            <a:ext cx="16583845" cy="11724042"/>
           </a:xfrm>
           <a:prstGeom prst="rect">
             <a:avLst/>
           </a:prstGeom>
         </p:spPr>
-        <p:txBody>
-          <a:bodyPr anchor="ctr"/>
-          <a:lstStyle>
-            <a:lvl1pPr algn="ctr">
-              <a:defRPr spc="-580" sz="29000"/>
-            </a:lvl1pPr>
-          </a:lstStyle>
-          <a:p>
-            <a:pPr/>
-            <a:r>
-              <a:t>DEMO</a:t>
-            </a:r>
-          </a:p>
-        </p:txBody>
-      </p:sp>
+      </p:pic>
     </p:spTree>
   </p:cSld>
   <p:clrMapOvr>
@@ -4225,7 +4223,65 @@
       </p:grpSpPr>
       <p:sp>
         <p:nvSpPr>
-          <p:cNvPr id="165" name="James Dawson"/>
+          <p:cNvPr id="165" name="DEMO"/>
+          <p:cNvSpPr txBox="1"/>
+          <p:nvPr>
+            <p:ph type="ctrTitle"/>
+          </p:nvPr>
+        </p:nvSpPr>
+        <p:spPr>
+          <a:xfrm>
+            <a:off x="1206498" y="4533900"/>
+            <a:ext cx="21971004" cy="4648200"/>
+          </a:xfrm>
+          <a:prstGeom prst="rect">
+            <a:avLst/>
+          </a:prstGeom>
+        </p:spPr>
+        <p:txBody>
+          <a:bodyPr anchor="ctr"/>
+          <a:lstStyle>
+            <a:lvl1pPr algn="ctr">
+              <a:defRPr spc="-580" sz="29000"/>
+            </a:lvl1pPr>
+          </a:lstStyle>
+          <a:p>
+            <a:pPr/>
+            <a:r>
+              <a:t>DEMO</a:t>
+            </a:r>
+          </a:p>
+        </p:txBody>
+      </p:sp>
+    </p:spTree>
+  </p:cSld>
+  <p:clrMapOvr>
+    <a:masterClrMapping/>
+  </p:clrMapOvr>
+  <p:transition xmlns:p14="http://schemas.microsoft.com/office/powerpoint/2010/main" spd="med" advClick="1"/>
+</p:sld>
+</file>
+
+<file path=ppt/slides/slide8.xml><?xml version="1.0" encoding="utf-8"?>
+<p:sld xmlns:a="http://schemas.openxmlformats.org/drawingml/2006/main" xmlns:r="http://schemas.openxmlformats.org/officeDocument/2006/relationships" xmlns:p="http://schemas.openxmlformats.org/presentationml/2006/main" xmlns:m="http://schemas.openxmlformats.org/officeDocument/2006/math" xmlns:a14="http://schemas.microsoft.com/office/drawing/2010/main" showMasterSp="1" showMasterPhAnim="1">
+  <p:cSld>
+    <p:spTree>
+      <p:nvGrpSpPr>
+        <p:cNvPr id="1" name=""/>
+        <p:cNvGrpSpPr/>
+        <p:nvPr/>
+      </p:nvGrpSpPr>
+      <p:grpSpPr>
+        <a:xfrm>
+          <a:off x="0" y="0"/>
+          <a:ext cx="0" cy="0"/>
+          <a:chOff x="0" y="0"/>
+          <a:chExt cx="0" cy="0"/>
+        </a:xfrm>
+      </p:grpSpPr>
+      <p:sp>
+        <p:nvSpPr>
+          <p:cNvPr id="167" name="James Dawson"/>
           <p:cNvSpPr txBox="1"/>
           <p:nvPr>
             <p:ph type="body" idx="13"/>
@@ -4256,7 +4312,7 @@
       </p:sp>
       <p:sp>
         <p:nvSpPr>
-          <p:cNvPr id="166" name="PLAGUE"/>
+          <p:cNvPr id="168" name="PLAGUE"/>
           <p:cNvSpPr txBox="1"/>
           <p:nvPr>
             <p:ph type="ctrTitle"/>
@@ -4288,7 +4344,7 @@
       </p:sp>
       <p:sp>
         <p:nvSpPr>
-          <p:cNvPr id="167" name="Project 1"/>
+          <p:cNvPr id="169" name="Project 1"/>
           <p:cNvSpPr txBox="1"/>
           <p:nvPr>
             <p:ph type="subTitle" sz="quarter" idx="1"/>

</xml_diff>

<commit_message>
added new slide to presentation
</commit_message>
<xml_diff>
--- a/Presentation/Project1Presentation.pptx
+++ b/Presentation/Project1Presentation.pptx
@@ -16,6 +16,7 @@
     <p:sldId id="261" r:id="rId13"/>
     <p:sldId id="262" r:id="rId14"/>
     <p:sldId id="263" r:id="rId15"/>
+    <p:sldId id="264" r:id="rId16"/>
   </p:sldIdLst>
   <p:sldSz cx="24384000" cy="13716000"/>
   <p:notesSz cx="6858000" cy="9144000"/>
@@ -4221,38 +4222,35 @@
           <a:chExt cx="0" cy="0"/>
         </a:xfrm>
       </p:grpSpPr>
-      <p:sp>
-        <p:nvSpPr>
-          <p:cNvPr id="165" name="DEMO"/>
-          <p:cNvSpPr txBox="1"/>
+      <p:pic>
+        <p:nvPicPr>
+          <p:cNvPr id="165" name="split.png" descr="split.png"/>
+          <p:cNvPicPr>
+            <a:picLocks noChangeAspect="1"/>
+          </p:cNvPicPr>
           <p:nvPr>
-            <p:ph type="ctrTitle"/>
+            <p:ph type="pic" idx="13"/>
           </p:nvPr>
-        </p:nvSpPr>
+        </p:nvPicPr>
+        <p:blipFill>
+          <a:blip r:embed="rId2">
+            <a:extLst/>
+          </a:blip>
+          <a:srcRect l="0" t="0" r="0" b="0"/>
+          <a:stretch>
+            <a:fillRect/>
+          </a:stretch>
+        </p:blipFill>
         <p:spPr>
           <a:xfrm>
-            <a:off x="1206498" y="4533900"/>
-            <a:ext cx="21971004" cy="4648200"/>
+            <a:off x="3900090" y="995957"/>
+            <a:ext cx="16583845" cy="11724042"/>
           </a:xfrm>
           <a:prstGeom prst="rect">
             <a:avLst/>
           </a:prstGeom>
         </p:spPr>
-        <p:txBody>
-          <a:bodyPr anchor="ctr"/>
-          <a:lstStyle>
-            <a:lvl1pPr algn="ctr">
-              <a:defRPr spc="-580" sz="29000"/>
-            </a:lvl1pPr>
-          </a:lstStyle>
-          <a:p>
-            <a:pPr/>
-            <a:r>
-              <a:t>DEMO</a:t>
-            </a:r>
-          </a:p>
-        </p:txBody>
-      </p:sp>
+      </p:pic>
     </p:spTree>
   </p:cSld>
   <p:clrMapOvr>
@@ -4281,7 +4279,65 @@
       </p:grpSpPr>
       <p:sp>
         <p:nvSpPr>
-          <p:cNvPr id="167" name="James Dawson"/>
+          <p:cNvPr id="167" name="DEMO"/>
+          <p:cNvSpPr txBox="1"/>
+          <p:nvPr>
+            <p:ph type="ctrTitle"/>
+          </p:nvPr>
+        </p:nvSpPr>
+        <p:spPr>
+          <a:xfrm>
+            <a:off x="1206498" y="4533900"/>
+            <a:ext cx="21971004" cy="4648200"/>
+          </a:xfrm>
+          <a:prstGeom prst="rect">
+            <a:avLst/>
+          </a:prstGeom>
+        </p:spPr>
+        <p:txBody>
+          <a:bodyPr anchor="ctr"/>
+          <a:lstStyle>
+            <a:lvl1pPr algn="ctr">
+              <a:defRPr spc="-580" sz="29000"/>
+            </a:lvl1pPr>
+          </a:lstStyle>
+          <a:p>
+            <a:pPr/>
+            <a:r>
+              <a:t>DEMO</a:t>
+            </a:r>
+          </a:p>
+        </p:txBody>
+      </p:sp>
+    </p:spTree>
+  </p:cSld>
+  <p:clrMapOvr>
+    <a:masterClrMapping/>
+  </p:clrMapOvr>
+  <p:transition xmlns:p14="http://schemas.microsoft.com/office/powerpoint/2010/main" spd="med" advClick="1"/>
+</p:sld>
+</file>
+
+<file path=ppt/slides/slide9.xml><?xml version="1.0" encoding="utf-8"?>
+<p:sld xmlns:a="http://schemas.openxmlformats.org/drawingml/2006/main" xmlns:r="http://schemas.openxmlformats.org/officeDocument/2006/relationships" xmlns:p="http://schemas.openxmlformats.org/presentationml/2006/main" xmlns:m="http://schemas.openxmlformats.org/officeDocument/2006/math" xmlns:a14="http://schemas.microsoft.com/office/drawing/2010/main" showMasterSp="1" showMasterPhAnim="1">
+  <p:cSld>
+    <p:spTree>
+      <p:nvGrpSpPr>
+        <p:cNvPr id="1" name=""/>
+        <p:cNvGrpSpPr/>
+        <p:nvPr/>
+      </p:nvGrpSpPr>
+      <p:grpSpPr>
+        <a:xfrm>
+          <a:off x="0" y="0"/>
+          <a:ext cx="0" cy="0"/>
+          <a:chOff x="0" y="0"/>
+          <a:chExt cx="0" cy="0"/>
+        </a:xfrm>
+      </p:grpSpPr>
+      <p:sp>
+        <p:nvSpPr>
+          <p:cNvPr id="169" name="James Dawson"/>
           <p:cNvSpPr txBox="1"/>
           <p:nvPr>
             <p:ph type="body" idx="13"/>
@@ -4312,7 +4368,7 @@
       </p:sp>
       <p:sp>
         <p:nvSpPr>
-          <p:cNvPr id="168" name="PLAGUE"/>
+          <p:cNvPr id="170" name="PLAGUE"/>
           <p:cNvSpPr txBox="1"/>
           <p:nvPr>
             <p:ph type="ctrTitle"/>
@@ -4344,7 +4400,7 @@
       </p:sp>
       <p:sp>
         <p:nvSpPr>
-          <p:cNvPr id="169" name="Project 1"/>
+          <p:cNvPr id="171" name="Project 1"/>
           <p:cNvSpPr txBox="1"/>
           <p:nvPr>
             <p:ph type="subTitle" sz="quarter" idx="1"/>

</xml_diff>